<commit_message>
Remove forward slash in last slide
</commit_message>
<xml_diff>
--- a/index.pptx
+++ b/index.pptx
@@ -14,6 +14,11 @@
     <p:sldId id="262" r:id="rId8"/>
     <p:sldId id="263" r:id="rId9"/>
     <p:sldId id="264" r:id="rId10"/>
+    <p:sldId id="265" r:id="rId11"/>
+    <p:sldId id="266" r:id="rId12"/>
+    <p:sldId id="267" r:id="rId13"/>
+    <p:sldId id="268" r:id="rId14"/>
+    <p:sldId id="269" r:id="rId15"/>
   </p:sldIdLst>
   <p:sldSz cx="9144000" cy="6858000" type="screen4x3"/>
   <p:notesSz cx="6858000" cy="9144000"/>
@@ -3270,6 +3275,293 @@
 </p:sld>
 </file>
 
+<file path=ppt/slides/slide10.xml><?xml version="1.0" encoding="utf-8"?>
+<p:sld xmlns:a="http://schemas.openxmlformats.org/drawingml/2006/main" xmlns:r="http://schemas.openxmlformats.org/officeDocument/2006/relationships" xmlns:p="http://schemas.openxmlformats.org/presentationml/2006/main">
+  <p:cSld>
+    <p:spTree>
+      <p:nvGrpSpPr>
+        <p:cNvPr id="1" name=""/>
+        <p:cNvGrpSpPr/>
+        <p:nvPr/>
+      </p:nvGrpSpPr>
+      <p:grpSpPr>
+        <a:xfrm>
+          <a:off x="0" y="0"/>
+          <a:ext cx="0" cy="0"/>
+          <a:chOff x="0" y="0"/>
+          <a:chExt cx="0" cy="0"/>
+        </a:xfrm>
+      </p:grpSpPr>
+      <p:pic>
+        <p:nvPicPr>
+          <p:cNvPr descr="./img/dsc-projects.png" id="0" name="Picture 1"/>
+          <p:cNvPicPr>
+            <a:picLocks noGrp="1" noChangeAspect="1"/>
+          </p:cNvPicPr>
+          <p:nvPr/>
+        </p:nvPicPr>
+        <p:blipFill>
+          <a:blip r:embed="rId2"/>
+          <a:stretch>
+            <a:fillRect/>
+          </a:stretch>
+        </p:blipFill>
+        <p:spPr bwMode="auto">
+          <a:xfrm>
+            <a:off x="1358900" y="1600200"/>
+            <a:ext cx="6426200" cy="4521200"/>
+          </a:xfrm>
+          <a:prstGeom prst="rect">
+            <a:avLst/>
+          </a:prstGeom>
+          <a:noFill/>
+          <a:ln w="9525">
+            <a:noFill/>
+            <a:headEnd/>
+            <a:tailEnd/>
+          </a:ln>
+        </p:spPr>
+      </p:pic>
+    </p:spTree>
+  </p:cSld>
+</p:sld>
+</file>
+
+<file path=ppt/slides/slide11.xml><?xml version="1.0" encoding="utf-8"?>
+<p:sld xmlns:a="http://schemas.openxmlformats.org/drawingml/2006/main" xmlns:r="http://schemas.openxmlformats.org/officeDocument/2006/relationships" xmlns:p="http://schemas.openxmlformats.org/presentationml/2006/main">
+  <p:cSld>
+    <p:spTree>
+      <p:nvGrpSpPr>
+        <p:cNvPr id="1" name=""/>
+        <p:cNvGrpSpPr/>
+        <p:nvPr/>
+      </p:nvGrpSpPr>
+      <p:grpSpPr>
+        <a:xfrm>
+          <a:off x="0" y="0"/>
+          <a:ext cx="0" cy="0"/>
+          <a:chOff x="0" y="0"/>
+          <a:chExt cx="0" cy="0"/>
+        </a:xfrm>
+      </p:grpSpPr>
+      <p:sp>
+        <p:nvSpPr>
+          <p:cNvPr id="3" name="Content Placeholder 2"/>
+          <p:cNvSpPr>
+            <a:spLocks noGrp="1"/>
+          </p:cNvSpPr>
+          <p:nvPr>
+            <p:ph idx="1"/>
+          </p:nvPr>
+        </p:nvSpPr>
+        <p:spPr/>
+        <p:txBody>
+          <a:bodyPr/>
+          <a:lstStyle/>
+          <a:p>
+            <a:pPr lvl="1"/>
+            <a:r>
+              <a:rPr/>
+              <a:t>MDataGov</a:t>
+            </a:r>
+          </a:p>
+          <a:p>
+            <a:pPr lvl="1"/>
+            <a:r>
+              <a:rPr/>
+              <a:t>Data Science Accelerator</a:t>
+            </a:r>
+          </a:p>
+          <a:p>
+            <a:pPr lvl="1"/>
+            <a:r>
+              <a:rPr/>
+              <a:t>DSC courses:</a:t>
+            </a:r>
+          </a:p>
+          <a:p>
+            <a:pPr lvl="2"/>
+            <a:r>
+              <a:rPr/>
+              <a:t>Fundamentals of Data Science</a:t>
+            </a:r>
+          </a:p>
+          <a:p>
+            <a:pPr lvl="2"/>
+            <a:r>
+              <a:rPr/>
+              <a:t>The Art of the Possible</a:t>
+            </a:r>
+          </a:p>
+        </p:txBody>
+      </p:sp>
+    </p:spTree>
+  </p:cSld>
+</p:sld>
+</file>
+
+<file path=ppt/slides/slide12.xml><?xml version="1.0" encoding="utf-8"?>
+<p:sld xmlns:a="http://schemas.openxmlformats.org/drawingml/2006/main" xmlns:r="http://schemas.openxmlformats.org/officeDocument/2006/relationships" xmlns:p="http://schemas.openxmlformats.org/presentationml/2006/main">
+  <p:cSld>
+    <p:spTree>
+      <p:nvGrpSpPr>
+        <p:cNvPr id="1" name=""/>
+        <p:cNvGrpSpPr/>
+        <p:nvPr/>
+      </p:nvGrpSpPr>
+      <p:grpSpPr>
+        <a:xfrm>
+          <a:off x="0" y="0"/>
+          <a:ext cx="0" cy="0"/>
+          <a:chOff x="0" y="0"/>
+          <a:chExt cx="0" cy="0"/>
+        </a:xfrm>
+      </p:grpSpPr>
+      <p:sp>
+        <p:nvSpPr>
+          <p:cNvPr id="3" name="Content Placeholder 2"/>
+          <p:cNvSpPr>
+            <a:spLocks noGrp="1"/>
+          </p:cNvSpPr>
+          <p:nvPr>
+            <p:ph idx="1"/>
+          </p:nvPr>
+        </p:nvSpPr>
+        <p:spPr/>
+        <p:txBody>
+          <a:bodyPr/>
+          <a:lstStyle/>
+          <a:p>
+            <a:pPr lvl="0" marL="0" indent="0">
+              <a:spcBef>
+                <a:spcPts val="3000"/>
+              </a:spcBef>
+              <a:buNone/>
+            </a:pPr>
+            <a:r>
+              <a:rPr b="1"/>
+              <a:t>Community of Practice</a:t>
+            </a:r>
+          </a:p>
+          <a:p>
+            <a:pPr lvl="0" marL="0" indent="0">
+              <a:spcBef>
+                <a:spcPts val="3000"/>
+              </a:spcBef>
+              <a:buNone/>
+            </a:pPr>
+          </a:p>
+        </p:txBody>
+      </p:sp>
+    </p:spTree>
+  </p:cSld>
+</p:sld>
+</file>
+
+<file path=ppt/slides/slide13.xml><?xml version="1.0" encoding="utf-8"?>
+<p:sld xmlns:a="http://schemas.openxmlformats.org/drawingml/2006/main" xmlns:r="http://schemas.openxmlformats.org/officeDocument/2006/relationships" xmlns:p="http://schemas.openxmlformats.org/presentationml/2006/main">
+  <p:cSld>
+    <p:spTree>
+      <p:nvGrpSpPr>
+        <p:cNvPr id="1" name=""/>
+        <p:cNvGrpSpPr/>
+        <p:nvPr/>
+      </p:nvGrpSpPr>
+      <p:grpSpPr>
+        <a:xfrm>
+          <a:off x="0" y="0"/>
+          <a:ext cx="0" cy="0"/>
+          <a:chOff x="0" y="0"/>
+          <a:chExt cx="0" cy="0"/>
+        </a:xfrm>
+      </p:grpSpPr>
+      <p:pic>
+        <p:nvPicPr>
+          <p:cNvPr descr="./img/community.jpeg" id="0" name="Picture 1"/>
+          <p:cNvPicPr>
+            <a:picLocks noGrp="1" noChangeAspect="1"/>
+          </p:cNvPicPr>
+          <p:nvPr/>
+        </p:nvPicPr>
+        <p:blipFill>
+          <a:blip r:embed="rId2"/>
+          <a:stretch>
+            <a:fillRect/>
+          </a:stretch>
+        </p:blipFill>
+        <p:spPr bwMode="auto">
+          <a:xfrm>
+            <a:off x="1790700" y="1600200"/>
+            <a:ext cx="5575300" cy="4521200"/>
+          </a:xfrm>
+          <a:prstGeom prst="rect">
+            <a:avLst/>
+          </a:prstGeom>
+          <a:noFill/>
+          <a:ln w="9525">
+            <a:noFill/>
+            <a:headEnd/>
+            <a:tailEnd/>
+          </a:ln>
+        </p:spPr>
+      </p:pic>
+    </p:spTree>
+  </p:cSld>
+</p:sld>
+</file>
+
+<file path=ppt/slides/slide14.xml><?xml version="1.0" encoding="utf-8"?>
+<p:sld xmlns:a="http://schemas.openxmlformats.org/drawingml/2006/main" xmlns:r="http://schemas.openxmlformats.org/officeDocument/2006/relationships" xmlns:p="http://schemas.openxmlformats.org/presentationml/2006/main">
+  <p:cSld>
+    <p:spTree>
+      <p:nvGrpSpPr>
+        <p:cNvPr id="1" name=""/>
+        <p:cNvGrpSpPr/>
+        <p:nvPr/>
+      </p:nvGrpSpPr>
+      <p:grpSpPr>
+        <a:xfrm>
+          <a:off x="0" y="0"/>
+          <a:ext cx="0" cy="0"/>
+          <a:chOff x="0" y="0"/>
+          <a:chExt cx="0" cy="0"/>
+        </a:xfrm>
+      </p:grpSpPr>
+      <p:pic>
+        <p:nvPicPr>
+          <p:cNvPr descr="https://slack-imgs.com/?c=1&amp;o1=ro&amp;url=https%3A%2F%2Fpbs.twimg.com%2Fmedia%2FENKs_2cUcAEDoE0.jpg" id="0" name="Picture 1"/>
+          <p:cNvPicPr>
+            <a:picLocks noGrp="1" noChangeAspect="1"/>
+          </p:cNvPicPr>
+          <p:nvPr/>
+        </p:nvPicPr>
+        <p:blipFill>
+          <a:blip r:embed="rId2"/>
+          <a:stretch>
+            <a:fillRect/>
+          </a:stretch>
+        </p:blipFill>
+        <p:spPr bwMode="auto">
+          <a:xfrm>
+            <a:off x="1790700" y="1600200"/>
+            <a:ext cx="5575300" cy="4521200"/>
+          </a:xfrm>
+          <a:prstGeom prst="rect">
+            <a:avLst/>
+          </a:prstGeom>
+          <a:noFill/>
+          <a:ln w="9525">
+            <a:noFill/>
+            <a:headEnd/>
+            <a:tailEnd/>
+          </a:ln>
+        </p:spPr>
+      </p:pic>
+    </p:spTree>
+  </p:cSld>
+</p:sld>
+</file>
+
 <file path=ppt/slides/slide2.xml><?xml version="1.0" encoding="utf-8"?>
 <p:sld xmlns:a="http://schemas.openxmlformats.org/drawingml/2006/main" xmlns:r="http://schemas.openxmlformats.org/officeDocument/2006/relationships" xmlns:p="http://schemas.openxmlformats.org/presentationml/2006/main">
   <p:cSld>
@@ -3367,49 +3659,101 @@
           <a:chExt cx="0" cy="0"/>
         </a:xfrm>
       </p:grpSpPr>
-      <p:sp>
-        <p:nvSpPr>
-          <p:cNvPr id="3" name="Content Placeholder 2"/>
-          <p:cNvSpPr>
-            <a:spLocks noGrp="1"/>
-          </p:cNvSpPr>
-          <p:nvPr>
-            <p:ph idx="1"/>
-          </p:nvPr>
-        </p:nvSpPr>
-        <p:spPr/>
-        <p:txBody>
-          <a:bodyPr/>
-          <a:lstStyle/>
-          <a:p>
-            <a:pPr lvl="0" marL="0" indent="0">
-              <a:buNone/>
-            </a:pPr>
-            <a:r>
-              <a:rPr/>
-              <a:t>#+begin</a:t>
-            </a:r>
-            <a:r>
-              <a:rPr baseline="-25000"/>
-              <a:t>NOTES</a:t>
-            </a:r>
-            <a:r>
-              <a:rPr/>
-              <a:t> nil#+end</a:t>
-            </a:r>
-            <a:r>
-              <a:rPr baseline="-25000"/>
-              <a:t>NOTES</a:t>
-            </a:r>
-          </a:p>
-        </p:txBody>
-      </p:sp>
+      <p:pic>
+        <p:nvPicPr>
+          <p:cNvPr descr="./img/career-map-resized.png" id="0" name="Picture 1"/>
+          <p:cNvPicPr>
+            <a:picLocks noGrp="1" noChangeAspect="1"/>
+          </p:cNvPicPr>
+          <p:nvPr/>
+        </p:nvPicPr>
+        <p:blipFill>
+          <a:blip r:embed="rId2"/>
+          <a:stretch>
+            <a:fillRect/>
+          </a:stretch>
+        </p:blipFill>
+        <p:spPr bwMode="auto">
+          <a:xfrm>
+            <a:off x="1143000" y="1600200"/>
+            <a:ext cx="6845300" cy="4521200"/>
+          </a:xfrm>
+          <a:prstGeom prst="rect">
+            <a:avLst/>
+          </a:prstGeom>
+          <a:noFill/>
+          <a:ln w="9525">
+            <a:noFill/>
+            <a:headEnd/>
+            <a:tailEnd/>
+          </a:ln>
+        </p:spPr>
+      </p:pic>
     </p:spTree>
   </p:cSld>
 </p:sld>
 </file>
 
 <file path=ppt/slides/slide4.xml><?xml version="1.0" encoding="utf-8"?>
+<p:sld xmlns:a="http://schemas.openxmlformats.org/drawingml/2006/main" xmlns:r="http://schemas.openxmlformats.org/officeDocument/2006/relationships" xmlns:p="http://schemas.openxmlformats.org/presentationml/2006/main">
+  <p:cSld>
+    <p:spTree>
+      <p:nvGrpSpPr>
+        <p:cNvPr id="1" name=""/>
+        <p:cNvGrpSpPr/>
+        <p:nvPr/>
+      </p:nvGrpSpPr>
+      <p:grpSpPr>
+        <a:xfrm>
+          <a:off x="0" y="0"/>
+          <a:ext cx="0" cy="0"/>
+          <a:chOff x="0" y="0"/>
+          <a:chExt cx="0" cy="0"/>
+        </a:xfrm>
+      </p:grpSpPr>
+      <p:sp>
+        <p:nvSpPr>
+          <p:cNvPr id="3" name="Content Placeholder 2"/>
+          <p:cNvSpPr>
+            <a:spLocks noGrp="1"/>
+          </p:cNvSpPr>
+          <p:nvPr>
+            <p:ph idx="1"/>
+          </p:nvPr>
+        </p:nvSpPr>
+        <p:spPr/>
+        <p:txBody>
+          <a:bodyPr/>
+          <a:lstStyle/>
+          <a:p>
+            <a:pPr lvl="0" marL="0" indent="0">
+              <a:buNone/>
+            </a:pPr>
+            <a:r>
+              <a:rPr/>
+              <a:t>#+begin</a:t>
+            </a:r>
+            <a:r>
+              <a:rPr baseline="-25000"/>
+              <a:t>NOTES</a:t>
+            </a:r>
+            <a:r>
+              <a:rPr/>
+              <a:t> nil#+end</a:t>
+            </a:r>
+            <a:r>
+              <a:rPr baseline="-25000"/>
+              <a:t>NOTES</a:t>
+            </a:r>
+          </a:p>
+        </p:txBody>
+      </p:sp>
+    </p:spTree>
+  </p:cSld>
+</p:sld>
+</file>
+
+<file path=ppt/slides/slide5.xml><?xml version="1.0" encoding="utf-8"?>
 <p:sld xmlns:a="http://schemas.openxmlformats.org/drawingml/2006/main" xmlns:r="http://schemas.openxmlformats.org/officeDocument/2006/relationships" xmlns:p="http://schemas.openxmlformats.org/presentationml/2006/main">
   <p:cSld>
     <p:spTree>
@@ -3461,7 +3805,7 @@
 </p:sld>
 </file>
 
-<file path=ppt/slides/slide5.xml><?xml version="1.0" encoding="utf-8"?>
+<file path=ppt/slides/slide6.xml><?xml version="1.0" encoding="utf-8"?>
 <p:sld xmlns:a="http://schemas.openxmlformats.org/drawingml/2006/main" xmlns:r="http://schemas.openxmlformats.org/officeDocument/2006/relationships" xmlns:p="http://schemas.openxmlformats.org/presentationml/2006/main">
   <p:cSld>
     <p:spTree>
@@ -3513,7 +3857,7 @@
 </p:sld>
 </file>
 
-<file path=ppt/slides/slide6.xml><?xml version="1.0" encoding="utf-8"?>
+<file path=ppt/slides/slide7.xml><?xml version="1.0" encoding="utf-8"?>
 <p:sld xmlns:a="http://schemas.openxmlformats.org/drawingml/2006/main" xmlns:r="http://schemas.openxmlformats.org/officeDocument/2006/relationships" xmlns:p="http://schemas.openxmlformats.org/presentationml/2006/main">
   <p:cSld>
     <p:spTree>
@@ -3565,135 +3909,6 @@
 </p:sld>
 </file>
 
-<file path=ppt/slides/slide7.xml><?xml version="1.0" encoding="utf-8"?>
-<p:sld xmlns:a="http://schemas.openxmlformats.org/drawingml/2006/main" xmlns:r="http://schemas.openxmlformats.org/officeDocument/2006/relationships" xmlns:p="http://schemas.openxmlformats.org/presentationml/2006/main">
-  <p:cSld>
-    <p:spTree>
-      <p:nvGrpSpPr>
-        <p:cNvPr id="1" name=""/>
-        <p:cNvGrpSpPr/>
-        <p:nvPr/>
-      </p:nvGrpSpPr>
-      <p:grpSpPr>
-        <a:xfrm>
-          <a:off x="0" y="0"/>
-          <a:ext cx="0" cy="0"/>
-          <a:chOff x="0" y="0"/>
-          <a:chExt cx="0" cy="0"/>
-        </a:xfrm>
-      </p:grpSpPr>
-      <p:sp>
-        <p:nvSpPr>
-          <p:cNvPr id="3" name="Content Placeholder 2"/>
-          <p:cNvSpPr>
-            <a:spLocks noGrp="1"/>
-          </p:cNvSpPr>
-          <p:nvPr>
-            <p:ph idx="1"/>
-          </p:nvPr>
-        </p:nvSpPr>
-        <p:spPr/>
-        <p:txBody>
-          <a:bodyPr/>
-          <a:lstStyle/>
-          <a:p>
-            <a:pPr lvl="0" marL="0" indent="0">
-              <a:buNone/>
-            </a:pPr>
-            <a:r>
-              <a:rPr/>
-              <a:t>We apply data science</a:t>
-            </a:r>
-          </a:p>
-          <a:p>
-            <a:pPr lvl="0" marL="0" indent="0">
-              <a:buNone/>
-            </a:pPr>
-            <a:r>
-              <a:rPr/>
-              <a:t>and build skills</a:t>
-            </a:r>
-          </a:p>
-          <a:p>
-            <a:pPr lvl="0" marL="0" indent="0">
-              <a:buNone/>
-            </a:pPr>
-            <a:r>
-              <a:rPr/>
-              <a:t>for public good</a:t>
-            </a:r>
-          </a:p>
-          <a:p>
-            <a:pPr lvl="0" marL="0" indent="0">
-              <a:buNone/>
-            </a:pPr>
-            <a:r>
-              <a:rPr/>
-              <a:t>We work at the frontier of data science and AI:</a:t>
-            </a:r>
-          </a:p>
-          <a:p>
-            <a:pPr lvl="1"/>
-            <a:r>
-              <a:rPr/>
-              <a:t>building skills and applying tools, methods and practices – to create new understanding and improve decision-making for public good.</a:t>
-            </a:r>
-          </a:p>
-          <a:p>
-            <a:pPr lvl="0" marL="0" indent="0">
-              <a:buNone/>
-            </a:pPr>
-            <a:r>
-              <a:rPr/>
-              <a:t>We define data science as:</a:t>
-            </a:r>
-          </a:p>
-          <a:p>
-            <a:pPr lvl="1"/>
-            <a:r>
-              <a:rPr/>
-              <a:t>Applying the tools, methods and practices of the digital and data age to create new understanding and improve decision-making.</a:t>
-            </a:r>
-          </a:p>
-          <a:p>
-            <a:pPr lvl="0" marL="0" indent="0">
-              <a:buNone/>
-            </a:pPr>
-            <a:r>
-              <a:rPr/>
-              <a:t>The goals of ONS’s Data Science Campus are:</a:t>
-            </a:r>
-          </a:p>
-          <a:p>
-            <a:pPr lvl="1"/>
-            <a:r>
-              <a:rPr/>
-              <a:t>to investigate the use of new data sources, including administrative data and big data for public good</a:t>
-            </a:r>
-          </a:p>
-          <a:p>
-            <a:pPr lvl="1"/>
-            <a:r>
-              <a:rPr/>
-              <a:t>to help build data science capability for the benefit of the UK</a:t>
-            </a:r>
-          </a:p>
-          <a:p>
-            <a:pPr lvl="0" marL="0" indent="0">
-              <a:buNone/>
-            </a:pPr>
-            <a:r>
-              <a:rPr/>
-              <a:t>A new generation of tools and technologies are used to exploit the growth and availability of these new data sources and provide rich informed measurement and analyses on the economy, the global environment and wider society.</a:t>
-            </a:r>
-          </a:p>
-        </p:txBody>
-      </p:sp>
-    </p:spTree>
-  </p:cSld>
-</p:sld>
-</file>
-
 <file path=ppt/slides/slide8.xml><?xml version="1.0" encoding="utf-8"?>
 <p:sld xmlns:a="http://schemas.openxmlformats.org/drawingml/2006/main" xmlns:r="http://schemas.openxmlformats.org/officeDocument/2006/relationships" xmlns:p="http://schemas.openxmlformats.org/presentationml/2006/main">
   <p:cSld>
@@ -3711,36 +3926,113 @@
           <a:chExt cx="0" cy="0"/>
         </a:xfrm>
       </p:grpSpPr>
-      <p:pic>
-        <p:nvPicPr>
-          <p:cNvPr descr="./img/dsc-projects.png" id="0" name="Picture 1"/>
-          <p:cNvPicPr>
-            <a:picLocks noGrp="1" noChangeAspect="1"/>
-          </p:cNvPicPr>
-          <p:nvPr/>
-        </p:nvPicPr>
-        <p:blipFill>
-          <a:blip r:embed="rId2"/>
-          <a:stretch>
-            <a:fillRect/>
-          </a:stretch>
-        </p:blipFill>
-        <p:spPr bwMode="auto">
-          <a:xfrm>
-            <a:off x="1358900" y="1600200"/>
-            <a:ext cx="6426200" cy="4521200"/>
-          </a:xfrm>
-          <a:prstGeom prst="rect">
-            <a:avLst/>
-          </a:prstGeom>
-          <a:noFill/>
-          <a:ln w="9525">
-            <a:noFill/>
-            <a:headEnd/>
-            <a:tailEnd/>
-          </a:ln>
-        </p:spPr>
-      </p:pic>
+      <p:sp>
+        <p:nvSpPr>
+          <p:cNvPr id="3" name="Content Placeholder 2"/>
+          <p:cNvSpPr>
+            <a:spLocks noGrp="1"/>
+          </p:cNvSpPr>
+          <p:nvPr>
+            <p:ph idx="1"/>
+          </p:nvPr>
+        </p:nvSpPr>
+        <p:spPr/>
+        <p:txBody>
+          <a:bodyPr/>
+          <a:lstStyle/>
+          <a:p>
+            <a:pPr lvl="0" marL="0" indent="0">
+              <a:buNone/>
+            </a:pPr>
+            <a:r>
+              <a:rPr/>
+              <a:t>We apply data science</a:t>
+            </a:r>
+          </a:p>
+          <a:p>
+            <a:pPr lvl="0" marL="0" indent="0">
+              <a:buNone/>
+            </a:pPr>
+            <a:r>
+              <a:rPr/>
+              <a:t>and build skills</a:t>
+            </a:r>
+          </a:p>
+          <a:p>
+            <a:pPr lvl="0" marL="0" indent="0">
+              <a:buNone/>
+            </a:pPr>
+            <a:r>
+              <a:rPr/>
+              <a:t>for public good</a:t>
+            </a:r>
+          </a:p>
+          <a:p>
+            <a:pPr lvl="0" marL="0" indent="0">
+              <a:buNone/>
+            </a:pPr>
+            <a:r>
+              <a:rPr/>
+              <a:t>We work at the frontier of data science and AI:</a:t>
+            </a:r>
+          </a:p>
+          <a:p>
+            <a:pPr lvl="1"/>
+            <a:r>
+              <a:rPr/>
+              <a:t>building skills and applying tools, methods and practices – to create new understanding and improve decision-making for public good.</a:t>
+            </a:r>
+          </a:p>
+          <a:p>
+            <a:pPr lvl="0" marL="0" indent="0">
+              <a:buNone/>
+            </a:pPr>
+            <a:r>
+              <a:rPr/>
+              <a:t>We define data science as:</a:t>
+            </a:r>
+          </a:p>
+          <a:p>
+            <a:pPr lvl="1"/>
+            <a:r>
+              <a:rPr/>
+              <a:t>Applying the tools, methods and practices of the digital and data age to create new understanding and improve decision-making.</a:t>
+            </a:r>
+          </a:p>
+          <a:p>
+            <a:pPr lvl="0" marL="0" indent="0">
+              <a:buNone/>
+            </a:pPr>
+            <a:r>
+              <a:rPr/>
+              <a:t>The goals of ONS’s Data Science Campus are:</a:t>
+            </a:r>
+          </a:p>
+          <a:p>
+            <a:pPr lvl="1"/>
+            <a:r>
+              <a:rPr/>
+              <a:t>to investigate the use of new data sources, including administrative data and big data for public good</a:t>
+            </a:r>
+          </a:p>
+          <a:p>
+            <a:pPr lvl="1"/>
+            <a:r>
+              <a:rPr/>
+              <a:t>to help build data science capability for the benefit of the UK</a:t>
+            </a:r>
+          </a:p>
+          <a:p>
+            <a:pPr lvl="0" marL="0" indent="0">
+              <a:buNone/>
+            </a:pPr>
+            <a:r>
+              <a:rPr/>
+              <a:t>A new generation of tools and technologies are used to exploit the growth and availability of these new data sources and provide rich informed measurement and analyses on the economy, the global environment and wider society.</a:t>
+            </a:r>
+          </a:p>
+        </p:txBody>
+      </p:sp>
     </p:spTree>
   </p:cSld>
 </p:sld>
@@ -3763,72 +4055,36 @@
           <a:chExt cx="0" cy="0"/>
         </a:xfrm>
       </p:grpSpPr>
-      <p:sp>
-        <p:nvSpPr>
-          <p:cNvPr id="3" name="Content Placeholder 2"/>
-          <p:cNvSpPr>
-            <a:spLocks noGrp="1"/>
-          </p:cNvSpPr>
-          <p:nvPr>
-            <p:ph idx="1"/>
-          </p:nvPr>
-        </p:nvSpPr>
-        <p:spPr/>
-        <p:txBody>
-          <a:bodyPr/>
-          <a:lstStyle/>
-          <a:p>
-            <a:pPr lvl="0" marL="0" indent="0">
-              <a:buNone/>
-            </a:pPr>
-            <a:r>
-              <a:rPr/>
-              <a:t> *</a:t>
-            </a:r>
-          </a:p>
-          <a:p>
-            <a:pPr lvl="0" marL="0" indent="0">
-              <a:buNone/>
-            </a:pPr>
-            <a:r>
-              <a:rPr/>
-              <a:t>MDataGov</a:t>
-            </a:r>
-          </a:p>
-          <a:p>
-            <a:pPr lvl="0" marL="0" indent="0">
-              <a:buNone/>
-            </a:pPr>
-            <a:r>
-              <a:rPr/>
-              <a:t>Data Science Accelerator</a:t>
-            </a:r>
-          </a:p>
-          <a:p>
-            <a:pPr lvl="0" marL="0" indent="0">
-              <a:buNone/>
-            </a:pPr>
-            <a:r>
-              <a:rPr/>
-              <a:t>DSC courses:</a:t>
-            </a:r>
-          </a:p>
-          <a:p>
-            <a:pPr lvl="1"/>
-            <a:r>
-              <a:rPr/>
-              <a:t>Fundamentals of Data Science</a:t>
-            </a:r>
-          </a:p>
-          <a:p>
-            <a:pPr lvl="1"/>
-            <a:r>
-              <a:rPr/>
-              <a:t>The Art of the Possible</a:t>
-            </a:r>
-          </a:p>
-        </p:txBody>
-      </p:sp>
+      <p:pic>
+        <p:nvPicPr>
+          <p:cNvPr descr="./img/open_prescribing_map_annotated.png" id="0" name="Picture 1"/>
+          <p:cNvPicPr>
+            <a:picLocks noGrp="1" noChangeAspect="1"/>
+          </p:cNvPicPr>
+          <p:nvPr/>
+        </p:nvPicPr>
+        <p:blipFill>
+          <a:blip r:embed="rId2"/>
+          <a:stretch>
+            <a:fillRect/>
+          </a:stretch>
+        </p:blipFill>
+        <p:spPr bwMode="auto">
+          <a:xfrm>
+            <a:off x="457200" y="1638300"/>
+            <a:ext cx="8229600" cy="4445000"/>
+          </a:xfrm>
+          <a:prstGeom prst="rect">
+            <a:avLst/>
+          </a:prstGeom>
+          <a:noFill/>
+          <a:ln w="9525">
+            <a:noFill/>
+            <a:headEnd/>
+            <a:tailEnd/>
+          </a:ln>
+        </p:spPr>
+      </p:pic>
     </p:spTree>
   </p:cSld>
 </p:sld>

</xml_diff>